<commit_message>
new presentation and some awesome fooonts
</commit_message>
<xml_diff>
--- a/SWIPE!.pptx
+++ b/SWIPE!.pptx
@@ -5,19 +5,21 @@
     <p:sldMasterId id="2147483658" r:id="rId4"/>
   </p:sldMasterIdLst>
   <p:notesMasterIdLst>
-    <p:notesMasterId r:id="rId12"/>
+    <p:notesMasterId r:id="rId14"/>
   </p:notesMasterIdLst>
   <p:handoutMasterIdLst>
-    <p:handoutMasterId r:id="rId13"/>
+    <p:handoutMasterId r:id="rId15"/>
   </p:handoutMasterIdLst>
   <p:sldIdLst>
     <p:sldId id="350" r:id="rId5"/>
     <p:sldId id="361" r:id="rId6"/>
-    <p:sldId id="365" r:id="rId7"/>
-    <p:sldId id="366" r:id="rId8"/>
-    <p:sldId id="367" r:id="rId9"/>
-    <p:sldId id="368" r:id="rId10"/>
-    <p:sldId id="343" r:id="rId11"/>
+    <p:sldId id="370" r:id="rId7"/>
+    <p:sldId id="365" r:id="rId8"/>
+    <p:sldId id="369" r:id="rId9"/>
+    <p:sldId id="366" r:id="rId10"/>
+    <p:sldId id="367" r:id="rId11"/>
+    <p:sldId id="368" r:id="rId12"/>
+    <p:sldId id="343" r:id="rId13"/>
   </p:sldIdLst>
   <p:sldSz cx="12192000" cy="6858000"/>
   <p:notesSz cx="6858000" cy="9144000"/>
@@ -117,6 +119,27 @@
     </a:lvl9pPr>
   </p:defaultTextStyle>
   <p:extLst>
+    <p:ext uri="{521415D9-36F7-43E2-AB2F-B90AF26B5E84}">
+      <p14:sectionLst xmlns:p14="http://schemas.microsoft.com/office/powerpoint/2010/main">
+        <p14:section name="Раздел по умолчанию" id="{931096DB-AC56-4431-9D6E-83DDE24F2740}">
+          <p14:sldIdLst>
+            <p14:sldId id="350"/>
+            <p14:sldId id="361"/>
+          </p14:sldIdLst>
+        </p14:section>
+        <p14:section name="Раздел без заголовка" id="{557CE85F-7A31-4356-8722-B06818E7CE49}">
+          <p14:sldIdLst>
+            <p14:sldId id="370"/>
+            <p14:sldId id="365"/>
+            <p14:sldId id="369"/>
+            <p14:sldId id="366"/>
+            <p14:sldId id="367"/>
+            <p14:sldId id="368"/>
+            <p14:sldId id="343"/>
+          </p14:sldIdLst>
+        </p14:section>
+      </p14:sectionLst>
+    </p:ext>
     <p:ext uri="{EFAFB233-063F-42B5-8137-9DF3F51BA10A}">
       <p15:sldGuideLst xmlns:p15="http://schemas.microsoft.com/office/powerpoint/2012/main"/>
     </p:ext>
@@ -131,442 +154,6 @@
 <p:cmAuthorLst xmlns:a="http://schemas.openxmlformats.org/drawingml/2006/main" xmlns:r="http://schemas.openxmlformats.org/officeDocument/2006/relationships" xmlns:p="http://schemas.openxmlformats.org/presentationml/2006/main">
   <p:cmAuthor id="3" name="Автор" initials="A" lastIdx="0" clrIdx="2"/>
 </p:cmAuthorLst>
-</file>
-
-<file path=ppt/changesInfos/changesInfo1.xml><?xml version="1.0" encoding="utf-8"?>
-<pc:chgInfo xmlns:a="http://schemas.openxmlformats.org/drawingml/2006/main" xmlns:r="http://schemas.openxmlformats.org/officeDocument/2006/relationships" xmlns:ac="http://schemas.microsoft.com/office/drawing/2013/main/command" xmlns:pc="http://schemas.microsoft.com/office/powerpoint/2013/main/command">
-  <pc:docChgLst>
-    <pc:chgData name="alex" userId="eb3325d178ccd48b" providerId="LiveId" clId="{768AA777-97E7-4121-A47A-FF9BDB754D32}"/>
-    <pc:docChg chg="undo custSel addSld delSld modSld">
-      <pc:chgData name="alex" userId="eb3325d178ccd48b" providerId="LiveId" clId="{768AA777-97E7-4121-A47A-FF9BDB754D32}" dt="2022-05-16T17:18:59.816" v="1331" actId="2711"/>
-      <pc:docMkLst>
-        <pc:docMk/>
-      </pc:docMkLst>
-      <pc:sldChg chg="addSp modSp mod">
-        <pc:chgData name="alex" userId="eb3325d178ccd48b" providerId="LiveId" clId="{768AA777-97E7-4121-A47A-FF9BDB754D32}" dt="2022-05-16T17:18:59.816" v="1331" actId="2711"/>
-        <pc:sldMkLst>
-          <pc:docMk/>
-          <pc:sldMk cId="2336677316" sldId="343"/>
-        </pc:sldMkLst>
-        <pc:spChg chg="mod">
-          <ac:chgData name="alex" userId="eb3325d178ccd48b" providerId="LiveId" clId="{768AA777-97E7-4121-A47A-FF9BDB754D32}" dt="2022-05-16T18:38:21.832" v="1129" actId="2711"/>
-          <ac:spMkLst>
-            <pc:docMk/>
-            <pc:sldMk cId="2336677316" sldId="343"/>
-            <ac:spMk id="2" creationId="{51DF3D98-3C30-4CFC-8643-C81E829C8C25}"/>
-          </ac:spMkLst>
-        </pc:spChg>
-        <pc:spChg chg="mod">
-          <ac:chgData name="alex" userId="eb3325d178ccd48b" providerId="LiveId" clId="{768AA777-97E7-4121-A47A-FF9BDB754D32}" dt="2022-05-16T17:18:59.816" v="1331" actId="2711"/>
-          <ac:spMkLst>
-            <pc:docMk/>
-            <pc:sldMk cId="2336677316" sldId="343"/>
-            <ac:spMk id="9" creationId="{76767661-63CB-A645-82F2-3B860E338B67}"/>
-          </ac:spMkLst>
-        </pc:spChg>
-        <pc:spChg chg="mod">
-          <ac:chgData name="alex" userId="eb3325d178ccd48b" providerId="LiveId" clId="{768AA777-97E7-4121-A47A-FF9BDB754D32}" dt="2022-05-16T18:39:42.011" v="1257" actId="6549"/>
-          <ac:spMkLst>
-            <pc:docMk/>
-            <pc:sldMk cId="2336677316" sldId="343"/>
-            <ac:spMk id="11" creationId="{F0F25866-5DB1-334A-8037-692579FBDE39}"/>
-          </ac:spMkLst>
-        </pc:spChg>
-        <pc:picChg chg="add mod">
-          <ac:chgData name="alex" userId="eb3325d178ccd48b" providerId="LiveId" clId="{768AA777-97E7-4121-A47A-FF9BDB754D32}" dt="2022-05-16T17:17:46.783" v="1322" actId="1076"/>
-          <ac:picMkLst>
-            <pc:docMk/>
-            <pc:sldMk cId="2336677316" sldId="343"/>
-            <ac:picMk id="6" creationId="{9351D96C-9795-20C6-35C0-06AB35E3FBB3}"/>
-          </ac:picMkLst>
-        </pc:picChg>
-      </pc:sldChg>
-      <pc:sldChg chg="modSp mod">
-        <pc:chgData name="alex" userId="eb3325d178ccd48b" providerId="LiveId" clId="{768AA777-97E7-4121-A47A-FF9BDB754D32}" dt="2022-05-16T18:33:06.206" v="1056" actId="14100"/>
-        <pc:sldMkLst>
-          <pc:docMk/>
-          <pc:sldMk cId="2960950710" sldId="350"/>
-        </pc:sldMkLst>
-        <pc:picChg chg="mod">
-          <ac:chgData name="alex" userId="eb3325d178ccd48b" providerId="LiveId" clId="{768AA777-97E7-4121-A47A-FF9BDB754D32}" dt="2022-05-16T18:33:06.206" v="1056" actId="14100"/>
-          <ac:picMkLst>
-            <pc:docMk/>
-            <pc:sldMk cId="2960950710" sldId="350"/>
-            <ac:picMk id="11" creationId="{AA9C9BC8-84A1-4B97-8C2A-A591C8B178FF}"/>
-          </ac:picMkLst>
-        </pc:picChg>
-      </pc:sldChg>
-      <pc:sldChg chg="del">
-        <pc:chgData name="alex" userId="eb3325d178ccd48b" providerId="LiveId" clId="{768AA777-97E7-4121-A47A-FF9BDB754D32}" dt="2022-05-16T17:46:15.156" v="347" actId="47"/>
-        <pc:sldMkLst>
-          <pc:docMk/>
-          <pc:sldMk cId="4206035864" sldId="355"/>
-        </pc:sldMkLst>
-      </pc:sldChg>
-      <pc:sldChg chg="addSp delSp modSp mod">
-        <pc:chgData name="alex" userId="eb3325d178ccd48b" providerId="LiveId" clId="{768AA777-97E7-4121-A47A-FF9BDB754D32}" dt="2022-05-16T18:37:14.683" v="1089" actId="478"/>
-        <pc:sldMkLst>
-          <pc:docMk/>
-          <pc:sldMk cId="391246093" sldId="361"/>
-        </pc:sldMkLst>
-        <pc:spChg chg="del">
-          <ac:chgData name="alex" userId="eb3325d178ccd48b" providerId="LiveId" clId="{768AA777-97E7-4121-A47A-FF9BDB754D32}" dt="2022-05-16T18:35:44.120" v="1066" actId="478"/>
-          <ac:spMkLst>
-            <pc:docMk/>
-            <pc:sldMk cId="391246093" sldId="361"/>
-            <ac:spMk id="6" creationId="{66F3960A-D260-8445-A153-0B674474CEBD}"/>
-          </ac:spMkLst>
-        </pc:spChg>
-        <pc:spChg chg="del">
-          <ac:chgData name="alex" userId="eb3325d178ccd48b" providerId="LiveId" clId="{768AA777-97E7-4121-A47A-FF9BDB754D32}" dt="2022-05-16T18:35:44.120" v="1066" actId="478"/>
-          <ac:spMkLst>
-            <pc:docMk/>
-            <pc:sldMk cId="391246093" sldId="361"/>
-            <ac:spMk id="7" creationId="{F37669F0-EA6D-6B46-AF0E-A9C2D1F223DB}"/>
-          </ac:spMkLst>
-        </pc:spChg>
-        <pc:picChg chg="add del mod">
-          <ac:chgData name="alex" userId="eb3325d178ccd48b" providerId="LiveId" clId="{768AA777-97E7-4121-A47A-FF9BDB754D32}" dt="2022-05-16T18:37:14.683" v="1089" actId="478"/>
-          <ac:picMkLst>
-            <pc:docMk/>
-            <pc:sldMk cId="391246093" sldId="361"/>
-            <ac:picMk id="5" creationId="{4EBD0744-0091-E899-CDAD-7AD0DDB42D27}"/>
-          </ac:picMkLst>
-        </pc:picChg>
-        <pc:picChg chg="add mod">
-          <ac:chgData name="alex" userId="eb3325d178ccd48b" providerId="LiveId" clId="{768AA777-97E7-4121-A47A-FF9BDB754D32}" dt="2022-05-16T18:37:13.068" v="1088"/>
-          <ac:picMkLst>
-            <pc:docMk/>
-            <pc:sldMk cId="391246093" sldId="361"/>
-            <ac:picMk id="9" creationId="{14A3384A-F207-E363-B867-DA161BD23036}"/>
-          </ac:picMkLst>
-        </pc:picChg>
-      </pc:sldChg>
-      <pc:sldChg chg="del">
-        <pc:chgData name="alex" userId="eb3325d178ccd48b" providerId="LiveId" clId="{768AA777-97E7-4121-A47A-FF9BDB754D32}" dt="2022-05-16T18:15:36.556" v="532" actId="47"/>
-        <pc:sldMkLst>
-          <pc:docMk/>
-          <pc:sldMk cId="767675903" sldId="362"/>
-        </pc:sldMkLst>
-      </pc:sldChg>
-      <pc:sldChg chg="addSp delSp modSp mod">
-        <pc:chgData name="alex" userId="eb3325d178ccd48b" providerId="LiveId" clId="{768AA777-97E7-4121-A47A-FF9BDB754D32}" dt="2022-05-16T18:37:11.587" v="1087" actId="478"/>
-        <pc:sldMkLst>
-          <pc:docMk/>
-          <pc:sldMk cId="3055144445" sldId="365"/>
-        </pc:sldMkLst>
-        <pc:spChg chg="del">
-          <ac:chgData name="alex" userId="eb3325d178ccd48b" providerId="LiveId" clId="{768AA777-97E7-4121-A47A-FF9BDB754D32}" dt="2022-05-16T18:36:03.362" v="1069" actId="478"/>
-          <ac:spMkLst>
-            <pc:docMk/>
-            <pc:sldMk cId="3055144445" sldId="365"/>
-            <ac:spMk id="11" creationId="{DBD97461-D246-4090-A81C-1B12820CBCC2}"/>
-          </ac:spMkLst>
-        </pc:spChg>
-        <pc:spChg chg="del">
-          <ac:chgData name="alex" userId="eb3325d178ccd48b" providerId="LiveId" clId="{768AA777-97E7-4121-A47A-FF9BDB754D32}" dt="2022-05-16T18:36:03.362" v="1069" actId="478"/>
-          <ac:spMkLst>
-            <pc:docMk/>
-            <pc:sldMk cId="3055144445" sldId="365"/>
-            <ac:spMk id="12" creationId="{B0EBE05D-A626-473F-AAF7-10386D6F1959}"/>
-          </ac:spMkLst>
-        </pc:spChg>
-        <pc:spChg chg="del">
-          <ac:chgData name="alex" userId="eb3325d178ccd48b" providerId="LiveId" clId="{768AA777-97E7-4121-A47A-FF9BDB754D32}" dt="2022-05-16T18:36:03.362" v="1069" actId="478"/>
-          <ac:spMkLst>
-            <pc:docMk/>
-            <pc:sldMk cId="3055144445" sldId="365"/>
-            <ac:spMk id="13" creationId="{F3C94AB2-FC73-4F8E-B5FE-CCD0E7DA1FEC}"/>
-          </ac:spMkLst>
-        </pc:spChg>
-        <pc:picChg chg="add del mod">
-          <ac:chgData name="alex" userId="eb3325d178ccd48b" providerId="LiveId" clId="{768AA777-97E7-4121-A47A-FF9BDB754D32}" dt="2022-05-16T18:36:07.425" v="1071" actId="478"/>
-          <ac:picMkLst>
-            <pc:docMk/>
-            <pc:sldMk cId="3055144445" sldId="365"/>
-            <ac:picMk id="14" creationId="{0F53E6EF-B12D-4ADD-143D-F38A6A3DED0E}"/>
-          </ac:picMkLst>
-        </pc:picChg>
-        <pc:picChg chg="add del mod">
-          <ac:chgData name="alex" userId="eb3325d178ccd48b" providerId="LiveId" clId="{768AA777-97E7-4121-A47A-FF9BDB754D32}" dt="2022-05-16T18:37:11.587" v="1087" actId="478"/>
-          <ac:picMkLst>
-            <pc:docMk/>
-            <pc:sldMk cId="3055144445" sldId="365"/>
-            <ac:picMk id="15" creationId="{FA7B20EC-A346-30E3-9933-984A3DB0BEB5}"/>
-          </ac:picMkLst>
-        </pc:picChg>
-        <pc:picChg chg="add mod">
-          <ac:chgData name="alex" userId="eb3325d178ccd48b" providerId="LiveId" clId="{768AA777-97E7-4121-A47A-FF9BDB754D32}" dt="2022-05-16T18:37:08.364" v="1086"/>
-          <ac:picMkLst>
-            <pc:docMk/>
-            <pc:sldMk cId="3055144445" sldId="365"/>
-            <ac:picMk id="16" creationId="{D0895114-68D0-A2DD-A378-6EE015540BA7}"/>
-          </ac:picMkLst>
-        </pc:picChg>
-      </pc:sldChg>
-      <pc:sldChg chg="addSp delSp modSp new mod">
-        <pc:chgData name="alex" userId="eb3325d178ccd48b" providerId="LiveId" clId="{768AA777-97E7-4121-A47A-FF9BDB754D32}" dt="2022-05-16T17:16:33.532" v="1315" actId="1076"/>
-        <pc:sldMkLst>
-          <pc:docMk/>
-          <pc:sldMk cId="138241101" sldId="366"/>
-        </pc:sldMkLst>
-        <pc:spChg chg="mod">
-          <ac:chgData name="alex" userId="eb3325d178ccd48b" providerId="LiveId" clId="{768AA777-97E7-4121-A47A-FF9BDB754D32}" dt="2022-05-16T17:46:05.793" v="346" actId="27636"/>
-          <ac:spMkLst>
-            <pc:docMk/>
-            <pc:sldMk cId="138241101" sldId="366"/>
-            <ac:spMk id="3" creationId="{3466ED03-F734-3851-C00D-5CBB99604614}"/>
-          </ac:spMkLst>
-        </pc:spChg>
-        <pc:spChg chg="mod">
-          <ac:chgData name="alex" userId="eb3325d178ccd48b" providerId="LiveId" clId="{768AA777-97E7-4121-A47A-FF9BDB754D32}" dt="2022-05-16T14:34:56.696" v="22" actId="2711"/>
-          <ac:spMkLst>
-            <pc:docMk/>
-            <pc:sldMk cId="138241101" sldId="366"/>
-            <ac:spMk id="4" creationId="{AA122F6A-1AFC-7D45-1909-38E106CEAAA7}"/>
-          </ac:spMkLst>
-        </pc:spChg>
-        <pc:spChg chg="del">
-          <ac:chgData name="alex" userId="eb3325d178ccd48b" providerId="LiveId" clId="{768AA777-97E7-4121-A47A-FF9BDB754D32}" dt="2022-05-16T14:33:48.115" v="1" actId="931"/>
-          <ac:spMkLst>
-            <pc:docMk/>
-            <pc:sldMk cId="138241101" sldId="366"/>
-            <ac:spMk id="5" creationId="{AFBA85DB-4B74-2B11-D244-4C13456E92AA}"/>
-          </ac:spMkLst>
-        </pc:spChg>
-        <pc:picChg chg="add mod modCrop">
-          <ac:chgData name="alex" userId="eb3325d178ccd48b" providerId="LiveId" clId="{768AA777-97E7-4121-A47A-FF9BDB754D32}" dt="2022-05-16T17:16:33.532" v="1315" actId="1076"/>
-          <ac:picMkLst>
-            <pc:docMk/>
-            <pc:sldMk cId="138241101" sldId="366"/>
-            <ac:picMk id="7" creationId="{2A16E028-CEDC-1AB4-EE5C-82C78A152F7C}"/>
-          </ac:picMkLst>
-        </pc:picChg>
-        <pc:picChg chg="add mod">
-          <ac:chgData name="alex" userId="eb3325d178ccd48b" providerId="LiveId" clId="{768AA777-97E7-4121-A47A-FF9BDB754D32}" dt="2022-05-16T18:37:00.529" v="1083" actId="1076"/>
-          <ac:picMkLst>
-            <pc:docMk/>
-            <pc:sldMk cId="138241101" sldId="366"/>
-            <ac:picMk id="8" creationId="{D76481F0-B8F0-CC88-C809-F00203E0769F}"/>
-          </ac:picMkLst>
-        </pc:picChg>
-      </pc:sldChg>
-      <pc:sldChg chg="addSp delSp modSp new mod">
-        <pc:chgData name="alex" userId="eb3325d178ccd48b" providerId="LiveId" clId="{768AA777-97E7-4121-A47A-FF9BDB754D32}" dt="2022-05-16T17:17:12.665" v="1318" actId="732"/>
-        <pc:sldMkLst>
-          <pc:docMk/>
-          <pc:sldMk cId="3990598569" sldId="367"/>
-        </pc:sldMkLst>
-        <pc:spChg chg="del">
-          <ac:chgData name="alex" userId="eb3325d178ccd48b" providerId="LiveId" clId="{768AA777-97E7-4121-A47A-FF9BDB754D32}" dt="2022-05-16T17:16:04.748" v="1307" actId="931"/>
-          <ac:spMkLst>
-            <pc:docMk/>
-            <pc:sldMk cId="3990598569" sldId="367"/>
-            <ac:spMk id="2" creationId="{84347B9C-8104-6243-4489-7A5F36730C3A}"/>
-          </ac:spMkLst>
-        </pc:spChg>
-        <pc:spChg chg="mod">
-          <ac:chgData name="alex" userId="eb3325d178ccd48b" providerId="LiveId" clId="{768AA777-97E7-4121-A47A-FF9BDB754D32}" dt="2022-05-16T17:46:36.129" v="358" actId="2711"/>
-          <ac:spMkLst>
-            <pc:docMk/>
-            <pc:sldMk cId="3990598569" sldId="367"/>
-            <ac:spMk id="3" creationId="{5D52F172-6301-18F3-D193-339E4D6C00A6}"/>
-          </ac:spMkLst>
-        </pc:spChg>
-        <pc:spChg chg="mod">
-          <ac:chgData name="alex" userId="eb3325d178ccd48b" providerId="LiveId" clId="{768AA777-97E7-4121-A47A-FF9BDB754D32}" dt="2022-05-16T17:47:30.404" v="531" actId="2711"/>
-          <ac:spMkLst>
-            <pc:docMk/>
-            <pc:sldMk cId="3990598569" sldId="367"/>
-            <ac:spMk id="4" creationId="{A5706A25-4B0E-7D64-2669-D4772D1C2D17}"/>
-          </ac:spMkLst>
-        </pc:spChg>
-        <pc:spChg chg="del">
-          <ac:chgData name="alex" userId="eb3325d178ccd48b" providerId="LiveId" clId="{768AA777-97E7-4121-A47A-FF9BDB754D32}" dt="2022-05-16T18:36:20.888" v="1075" actId="478"/>
-          <ac:spMkLst>
-            <pc:docMk/>
-            <pc:sldMk cId="3990598569" sldId="367"/>
-            <ac:spMk id="5" creationId="{97CEDDD9-4693-45AD-24E9-47B97D8AC181}"/>
-          </ac:spMkLst>
-        </pc:spChg>
-        <pc:spChg chg="del">
-          <ac:chgData name="alex" userId="eb3325d178ccd48b" providerId="LiveId" clId="{768AA777-97E7-4121-A47A-FF9BDB754D32}" dt="2022-05-16T18:36:20.888" v="1075" actId="478"/>
-          <ac:spMkLst>
-            <pc:docMk/>
-            <pc:sldMk cId="3990598569" sldId="367"/>
-            <ac:spMk id="6" creationId="{FD0945AF-21FE-0215-6D70-6DEAE8E1FFDA}"/>
-          </ac:spMkLst>
-        </pc:spChg>
-        <pc:spChg chg="del">
-          <ac:chgData name="alex" userId="eb3325d178ccd48b" providerId="LiveId" clId="{768AA777-97E7-4121-A47A-FF9BDB754D32}" dt="2022-05-16T18:36:20.888" v="1075" actId="478"/>
-          <ac:spMkLst>
-            <pc:docMk/>
-            <pc:sldMk cId="3990598569" sldId="367"/>
-            <ac:spMk id="7" creationId="{AD35B9DA-A6D2-A4BF-EDFE-74196137CC36}"/>
-          </ac:spMkLst>
-        </pc:spChg>
-        <pc:picChg chg="add mod modCrop">
-          <ac:chgData name="alex" userId="eb3325d178ccd48b" providerId="LiveId" clId="{768AA777-97E7-4121-A47A-FF9BDB754D32}" dt="2022-05-16T17:17:12.665" v="1318" actId="732"/>
-          <ac:picMkLst>
-            <pc:docMk/>
-            <pc:sldMk cId="3990598569" sldId="367"/>
-            <ac:picMk id="6" creationId="{3CAFA94A-DCF6-6D37-33A1-4CAAE72D98AF}"/>
-          </ac:picMkLst>
-        </pc:picChg>
-        <pc:picChg chg="add del mod">
-          <ac:chgData name="alex" userId="eb3325d178ccd48b" providerId="LiveId" clId="{768AA777-97E7-4121-A47A-FF9BDB754D32}" dt="2022-05-16T18:37:29.298" v="1091" actId="478"/>
-          <ac:picMkLst>
-            <pc:docMk/>
-            <pc:sldMk cId="3990598569" sldId="367"/>
-            <ac:picMk id="8" creationId="{633A958F-6AF6-4847-3C18-5D61ABCFCC41}"/>
-          </ac:picMkLst>
-        </pc:picChg>
-        <pc:picChg chg="add mod">
-          <ac:chgData name="alex" userId="eb3325d178ccd48b" providerId="LiveId" clId="{768AA777-97E7-4121-A47A-FF9BDB754D32}" dt="2022-05-16T18:37:27.729" v="1090"/>
-          <ac:picMkLst>
-            <pc:docMk/>
-            <pc:sldMk cId="3990598569" sldId="367"/>
-            <ac:picMk id="9" creationId="{41EB62B6-886C-7355-9EA0-ADCFB188680A}"/>
-          </ac:picMkLst>
-        </pc:picChg>
-      </pc:sldChg>
-      <pc:sldChg chg="addSp delSp modSp new mod">
-        <pc:chgData name="alex" userId="eb3325d178ccd48b" providerId="LiveId" clId="{768AA777-97E7-4121-A47A-FF9BDB754D32}" dt="2022-05-16T17:17:31.528" v="1319" actId="113"/>
-        <pc:sldMkLst>
-          <pc:docMk/>
-          <pc:sldMk cId="4029711943" sldId="368"/>
-        </pc:sldMkLst>
-        <pc:spChg chg="mod">
-          <ac:chgData name="alex" userId="eb3325d178ccd48b" providerId="LiveId" clId="{768AA777-97E7-4121-A47A-FF9BDB754D32}" dt="2022-05-16T18:16:17.655" v="555" actId="14100"/>
-          <ac:spMkLst>
-            <pc:docMk/>
-            <pc:sldMk cId="4029711943" sldId="368"/>
-            <ac:spMk id="2" creationId="{AADA6156-7655-4B71-EACA-137584BFAC2C}"/>
-          </ac:spMkLst>
-        </pc:spChg>
-        <pc:spChg chg="mod">
-          <ac:chgData name="alex" userId="eb3325d178ccd48b" providerId="LiveId" clId="{768AA777-97E7-4121-A47A-FF9BDB754D32}" dt="2022-05-16T18:25:48.624" v="864" actId="2711"/>
-          <ac:spMkLst>
-            <pc:docMk/>
-            <pc:sldMk cId="4029711943" sldId="368"/>
-            <ac:spMk id="3" creationId="{2684073F-D43E-DDBE-B673-71A338107D38}"/>
-          </ac:spMkLst>
-        </pc:spChg>
-        <pc:spChg chg="mod">
-          <ac:chgData name="alex" userId="eb3325d178ccd48b" providerId="LiveId" clId="{768AA777-97E7-4121-A47A-FF9BDB754D32}" dt="2022-05-16T18:30:18.368" v="1024" actId="207"/>
-          <ac:spMkLst>
-            <pc:docMk/>
-            <pc:sldMk cId="4029711943" sldId="368"/>
-            <ac:spMk id="4" creationId="{29A5F7F9-D821-1422-A336-7F11A77B40DE}"/>
-          </ac:spMkLst>
-        </pc:spChg>
-        <pc:spChg chg="mod">
-          <ac:chgData name="alex" userId="eb3325d178ccd48b" providerId="LiveId" clId="{768AA777-97E7-4121-A47A-FF9BDB754D32}" dt="2022-05-16T18:25:43.285" v="863" actId="2711"/>
-          <ac:spMkLst>
-            <pc:docMk/>
-            <pc:sldMk cId="4029711943" sldId="368"/>
-            <ac:spMk id="5" creationId="{52BA37C6-7E55-B706-5A80-E90B306F7281}"/>
-          </ac:spMkLst>
-        </pc:spChg>
-        <pc:spChg chg="mod">
-          <ac:chgData name="alex" userId="eb3325d178ccd48b" providerId="LiveId" clId="{768AA777-97E7-4121-A47A-FF9BDB754D32}" dt="2022-05-16T18:30:18.368" v="1024" actId="207"/>
-          <ac:spMkLst>
-            <pc:docMk/>
-            <pc:sldMk cId="4029711943" sldId="368"/>
-            <ac:spMk id="6" creationId="{FE4163E1-494F-CBF2-A06F-6FE04B39A284}"/>
-          </ac:spMkLst>
-        </pc:spChg>
-        <pc:spChg chg="mod">
-          <ac:chgData name="alex" userId="eb3325d178ccd48b" providerId="LiveId" clId="{768AA777-97E7-4121-A47A-FF9BDB754D32}" dt="2022-05-16T18:29:32.648" v="954" actId="2711"/>
-          <ac:spMkLst>
-            <pc:docMk/>
-            <pc:sldMk cId="4029711943" sldId="368"/>
-            <ac:spMk id="7" creationId="{C5E6D3EE-F104-BDFB-83AE-B27AC2F3365A}"/>
-          </ac:spMkLst>
-        </pc:spChg>
-        <pc:spChg chg="mod">
-          <ac:chgData name="alex" userId="eb3325d178ccd48b" providerId="LiveId" clId="{768AA777-97E7-4121-A47A-FF9BDB754D32}" dt="2022-05-16T17:17:31.528" v="1319" actId="113"/>
-          <ac:spMkLst>
-            <pc:docMk/>
-            <pc:sldMk cId="4029711943" sldId="368"/>
-            <ac:spMk id="8" creationId="{BAC41AEC-0E21-A8E8-1ED1-0BAC5470B74E}"/>
-          </ac:spMkLst>
-        </pc:spChg>
-        <pc:spChg chg="mod">
-          <ac:chgData name="alex" userId="eb3325d178ccd48b" providerId="LiveId" clId="{768AA777-97E7-4121-A47A-FF9BDB754D32}" dt="2022-05-16T18:30:05.623" v="1021" actId="2711"/>
-          <ac:spMkLst>
-            <pc:docMk/>
-            <pc:sldMk cId="4029711943" sldId="368"/>
-            <ac:spMk id="9" creationId="{23184532-A5ED-16F0-A881-493A8B396533}"/>
-          </ac:spMkLst>
-        </pc:spChg>
-        <pc:spChg chg="mod">
-          <ac:chgData name="alex" userId="eb3325d178ccd48b" providerId="LiveId" clId="{768AA777-97E7-4121-A47A-FF9BDB754D32}" dt="2022-05-16T17:17:31.528" v="1319" actId="113"/>
-          <ac:spMkLst>
-            <pc:docMk/>
-            <pc:sldMk cId="4029711943" sldId="368"/>
-            <ac:spMk id="10" creationId="{E59764B0-B857-9496-710F-C9CAC51F9D79}"/>
-          </ac:spMkLst>
-        </pc:spChg>
-        <pc:spChg chg="mod">
-          <ac:chgData name="alex" userId="eb3325d178ccd48b" providerId="LiveId" clId="{768AA777-97E7-4121-A47A-FF9BDB754D32}" dt="2022-05-16T17:17:31.528" v="1319" actId="113"/>
-          <ac:spMkLst>
-            <pc:docMk/>
-            <pc:sldMk cId="4029711943" sldId="368"/>
-            <ac:spMk id="12" creationId="{42A76E00-E0BE-B878-97C3-00FBE8E6EE1E}"/>
-          </ac:spMkLst>
-        </pc:spChg>
-        <pc:spChg chg="del">
-          <ac:chgData name="alex" userId="eb3325d178ccd48b" providerId="LiveId" clId="{768AA777-97E7-4121-A47A-FF9BDB754D32}" dt="2022-05-16T18:36:26.373" v="1077" actId="478"/>
-          <ac:spMkLst>
-            <pc:docMk/>
-            <pc:sldMk cId="4029711943" sldId="368"/>
-            <ac:spMk id="13" creationId="{ABD0A12A-0D45-11F7-105D-C41D03327B85}"/>
-          </ac:spMkLst>
-        </pc:spChg>
-        <pc:spChg chg="del">
-          <ac:chgData name="alex" userId="eb3325d178ccd48b" providerId="LiveId" clId="{768AA777-97E7-4121-A47A-FF9BDB754D32}" dt="2022-05-16T18:36:26.373" v="1077" actId="478"/>
-          <ac:spMkLst>
-            <pc:docMk/>
-            <pc:sldMk cId="4029711943" sldId="368"/>
-            <ac:spMk id="14" creationId="{49994EA9-BAF9-C4FD-312B-9DA4F370622F}"/>
-          </ac:spMkLst>
-        </pc:spChg>
-        <pc:spChg chg="del">
-          <ac:chgData name="alex" userId="eb3325d178ccd48b" providerId="LiveId" clId="{768AA777-97E7-4121-A47A-FF9BDB754D32}" dt="2022-05-16T18:36:26.373" v="1077" actId="478"/>
-          <ac:spMkLst>
-            <pc:docMk/>
-            <pc:sldMk cId="4029711943" sldId="368"/>
-            <ac:spMk id="15" creationId="{0A120A06-ED16-4810-7FCB-CDF21932C366}"/>
-          </ac:spMkLst>
-        </pc:spChg>
-        <pc:picChg chg="add del mod">
-          <ac:chgData name="alex" userId="eb3325d178ccd48b" providerId="LiveId" clId="{768AA777-97E7-4121-A47A-FF9BDB754D32}" dt="2022-05-16T18:37:03.789" v="1084" actId="478"/>
-          <ac:picMkLst>
-            <pc:docMk/>
-            <pc:sldMk cId="4029711943" sldId="368"/>
-            <ac:picMk id="16" creationId="{B72E84F1-A501-0C14-F865-3D5A93232CA7}"/>
-          </ac:picMkLst>
-        </pc:picChg>
-        <pc:picChg chg="add mod">
-          <ac:chgData name="alex" userId="eb3325d178ccd48b" providerId="LiveId" clId="{768AA777-97E7-4121-A47A-FF9BDB754D32}" dt="2022-05-16T18:37:04.074" v="1085"/>
-          <ac:picMkLst>
-            <pc:docMk/>
-            <pc:sldMk cId="4029711943" sldId="368"/>
-            <ac:picMk id="17" creationId="{35A40ACB-0176-DA17-7E4E-4DD39865AE0B}"/>
-          </ac:picMkLst>
-        </pc:picChg>
-      </pc:sldChg>
-      <pc:sldChg chg="new del">
-        <pc:chgData name="alex" userId="eb3325d178ccd48b" providerId="LiveId" clId="{768AA777-97E7-4121-A47A-FF9BDB754D32}" dt="2022-05-16T18:15:48.679" v="534" actId="47"/>
-        <pc:sldMkLst>
-          <pc:docMk/>
-          <pc:sldMk cId="4150188280" sldId="368"/>
-        </pc:sldMkLst>
-      </pc:sldChg>
-    </pc:docChg>
-  </pc:docChgLst>
-</pc:chgInfo>
 </file>
 
 <file path=ppt/handoutMasters/handoutMaster1.xml><?xml version="1.0" encoding="utf-8"?>
@@ -805,7 +392,7 @@
             <a:pPr rtl="0"/>
             <a:fld id="{596A8B07-5413-4D77-95BF-775BA37A015B}" type="datetime1">
               <a:rPr lang="ru-RU" noProof="0" smtClean="0"/>
-              <a:t>16.05.2022</a:t>
+              <a:t>23.05.2022</a:t>
             </a:fld>
             <a:endParaRPr lang="ru-RU" noProof="0"/>
           </a:p>
@@ -1313,7 +900,7 @@
             <a:pPr rtl="0"/>
             <a:fld id="{A89C7E07-3C67-C64C-8DA0-0404F6303970}" type="slidenum">
               <a:rPr lang="ru-RU" smtClean="0"/>
-              <a:t>7</a:t>
+              <a:t>9</a:t>
             </a:fld>
             <a:endParaRPr lang="ru-RU"/>
           </a:p>
@@ -2653,7 +2240,7 @@
               <a:rPr lang="ru-RU" noProof="0" smtClean="0">
                 <a:latin typeface="+mn-lt"/>
               </a:rPr>
-              <a:t>16 мая 2022 г.</a:t>
+              <a:t>23 мая 2022 г.</a:t>
             </a:fld>
             <a:endParaRPr lang="ru-RU" noProof="0" dirty="0">
               <a:latin typeface="+mn-lt"/>
@@ -3789,7 +3376,7 @@
               <a:rPr lang="ru-RU" noProof="0" smtClean="0">
                 <a:latin typeface="+mn-lt"/>
               </a:rPr>
-              <a:t>16 мая 2022 г.</a:t>
+              <a:t>23 мая 2022 г.</a:t>
             </a:fld>
             <a:endParaRPr lang="ru-RU" noProof="0" dirty="0">
               <a:latin typeface="+mn-lt"/>
@@ -3881,12 +3468,12 @@
             <a:srgbClr val="FBAE40"/>
           </p15:clr>
         </p15:guide>
-        <p15:guide id="3" pos="2520" userDrawn="1">
+        <p15:guide id="3" pos="2520">
           <p15:clr>
             <a:srgbClr val="FBAE40"/>
           </p15:clr>
         </p15:guide>
-        <p15:guide id="4" pos="5160" userDrawn="1">
+        <p15:guide id="4" pos="5160">
           <p15:clr>
             <a:srgbClr val="FBAE40"/>
           </p15:clr>
@@ -3906,17 +3493,17 @@
             <a:srgbClr val="FBAE40"/>
           </p15:clr>
         </p15:guide>
-        <p15:guide id="10" pos="4800" userDrawn="1">
+        <p15:guide id="10" pos="4800">
           <p15:clr>
             <a:srgbClr val="FBAE40"/>
           </p15:clr>
         </p15:guide>
-        <p15:guide id="11" pos="2880" userDrawn="1">
+        <p15:guide id="11" pos="2880">
           <p15:clr>
             <a:srgbClr val="FBAE40"/>
           </p15:clr>
         </p15:guide>
-        <p15:guide id="12" orient="horz" pos="1752" userDrawn="1">
+        <p15:guide id="12" orient="horz" pos="1752">
           <p15:clr>
             <a:srgbClr val="FBAE40"/>
           </p15:clr>
@@ -4924,7 +4511,7 @@
               <a:rPr lang="ru-RU" noProof="0" smtClean="0">
                 <a:latin typeface="+mn-lt"/>
               </a:rPr>
-              <a:t>16 мая 2022 г.</a:t>
+              <a:t>23 мая 2022 г.</a:t>
             </a:fld>
             <a:endParaRPr lang="ru-RU" noProof="0" dirty="0">
               <a:latin typeface="+mn-lt"/>
@@ -5698,7 +5285,7 @@
   <p:extLst>
     <p:ext uri="{DCECCB84-F9BA-43D5-87BE-67443E8EF086}">
       <p15:sldGuideLst xmlns:p15="http://schemas.microsoft.com/office/powerpoint/2012/main">
-        <p15:guide id="1" pos="600" userDrawn="1">
+        <p15:guide id="1" pos="600">
           <p15:clr>
             <a:srgbClr val="FBAE40"/>
           </p15:clr>
@@ -7236,7 +6823,7 @@
               <a:rPr lang="ru-RU" noProof="0" smtClean="0">
                 <a:latin typeface="+mn-lt"/>
               </a:rPr>
-              <a:t>16 мая 2022 г.</a:t>
+              <a:t>23 мая 2022 г.</a:t>
             </a:fld>
             <a:endParaRPr lang="ru-RU" noProof="0" dirty="0">
               <a:latin typeface="+mn-lt"/>
@@ -7878,7 +7465,7 @@
               <a:rPr lang="ru-RU" noProof="0" smtClean="0">
                 <a:latin typeface="+mn-lt"/>
               </a:rPr>
-              <a:t>16 мая 2022 г.</a:t>
+              <a:t>23 мая 2022 г.</a:t>
             </a:fld>
             <a:endParaRPr lang="ru-RU" noProof="0" dirty="0">
               <a:latin typeface="+mn-lt"/>
@@ -7965,22 +7552,22 @@
             <a:srgbClr val="FBAE40"/>
           </p15:clr>
         </p15:guide>
-        <p15:guide id="6" pos="3480" userDrawn="1">
+        <p15:guide id="6" pos="3480">
           <p15:clr>
             <a:srgbClr val="FBAE40"/>
           </p15:clr>
         </p15:guide>
-        <p15:guide id="7" orient="horz" pos="1440" userDrawn="1">
+        <p15:guide id="7" orient="horz" pos="1440">
           <p15:clr>
             <a:srgbClr val="FBAE40"/>
           </p15:clr>
         </p15:guide>
-        <p15:guide id="9" orient="horz" pos="1224" userDrawn="1">
+        <p15:guide id="9" orient="horz" pos="1224">
           <p15:clr>
             <a:srgbClr val="FBAE40"/>
           </p15:clr>
         </p15:guide>
-        <p15:guide id="10" orient="horz" pos="552" userDrawn="1">
+        <p15:guide id="10" orient="horz" pos="552">
           <p15:clr>
             <a:srgbClr val="FBAE40"/>
           </p15:clr>
@@ -8655,7 +8242,7 @@
               <a:rPr lang="ru-RU" noProof="0" smtClean="0">
                 <a:latin typeface="+mn-lt"/>
               </a:rPr>
-              <a:t>16 мая 2022 г.</a:t>
+              <a:t>23 мая 2022 г.</a:t>
             </a:fld>
             <a:endParaRPr lang="ru-RU" noProof="0">
               <a:latin typeface="+mn-lt"/>
@@ -8923,7 +8510,7 @@
               <a:rPr lang="ru-RU" noProof="0" smtClean="0">
                 <a:latin typeface="+mn-lt"/>
               </a:rPr>
-              <a:t>16 мая 2022 г.</a:t>
+              <a:t>23 мая 2022 г.</a:t>
             </a:fld>
             <a:endParaRPr lang="ru-RU" noProof="0">
               <a:latin typeface="+mn-lt"/>
@@ -11873,7 +11460,7 @@
               <a:rPr lang="ru-RU" noProof="0" smtClean="0">
                 <a:latin typeface="+mn-lt"/>
               </a:rPr>
-              <a:t>16 мая 2022 г.</a:t>
+              <a:t>23 мая 2022 г.</a:t>
             </a:fld>
             <a:endParaRPr lang="ru-RU" noProof="0" dirty="0">
               <a:latin typeface="+mn-lt"/>
@@ -13050,7 +12637,7 @@
               <a:rPr lang="ru-RU" noProof="0" smtClean="0">
                 <a:latin typeface="+mn-lt"/>
               </a:rPr>
-              <a:t>16 мая 2022 г.</a:t>
+              <a:t>23 мая 2022 г.</a:t>
             </a:fld>
             <a:endParaRPr lang="ru-RU" noProof="0">
               <a:latin typeface="+mn-lt"/>
@@ -13139,52 +12726,52 @@
             <a:srgbClr val="FBAE40"/>
           </p15:clr>
         </p15:guide>
-        <p15:guide id="2" pos="7080" userDrawn="1">
+        <p15:guide id="2" pos="7080">
           <p15:clr>
             <a:srgbClr val="FBAE40"/>
           </p15:clr>
         </p15:guide>
-        <p15:guide id="3" pos="2880" userDrawn="1">
+        <p15:guide id="3" pos="2880">
           <p15:clr>
             <a:srgbClr val="FBAE40"/>
           </p15:clr>
         </p15:guide>
-        <p15:guide id="4" pos="5160" userDrawn="1">
+        <p15:guide id="4" pos="5160">
           <p15:clr>
             <a:srgbClr val="FBAE40"/>
           </p15:clr>
         </p15:guide>
-        <p15:guide id="5" pos="2520" userDrawn="1">
+        <p15:guide id="5" pos="2520">
           <p15:clr>
             <a:srgbClr val="FBAE40"/>
           </p15:clr>
         </p15:guide>
-        <p15:guide id="6" pos="4800" userDrawn="1">
+        <p15:guide id="6" pos="4800">
           <p15:clr>
             <a:srgbClr val="FBAE40"/>
           </p15:clr>
         </p15:guide>
-        <p15:guide id="7" orient="horz" pos="1224" userDrawn="1">
+        <p15:guide id="7" orient="horz" pos="1224">
           <p15:clr>
             <a:srgbClr val="FBAE40"/>
           </p15:clr>
         </p15:guide>
-        <p15:guide id="8" orient="horz" pos="3768" userDrawn="1">
+        <p15:guide id="8" orient="horz" pos="3768">
           <p15:clr>
             <a:srgbClr val="FBAE40"/>
           </p15:clr>
         </p15:guide>
-        <p15:guide id="9" orient="horz" pos="552" userDrawn="1">
+        <p15:guide id="9" orient="horz" pos="552">
           <p15:clr>
             <a:srgbClr val="FBAE40"/>
           </p15:clr>
         </p15:guide>
-        <p15:guide id="10" orient="horz" pos="1512" userDrawn="1">
+        <p15:guide id="10" orient="horz" pos="1512">
           <p15:clr>
             <a:srgbClr val="FBAE40"/>
           </p15:clr>
         </p15:guide>
-        <p15:guide id="11" orient="horz" pos="2832" userDrawn="1">
+        <p15:guide id="11" orient="horz" pos="2832">
           <p15:clr>
             <a:srgbClr val="FBAE40"/>
           </p15:clr>
@@ -13369,7 +12956,7 @@
               <a:rPr lang="ru-RU" noProof="0" smtClean="0">
                 <a:latin typeface="+mn-lt"/>
               </a:rPr>
-              <a:t>16 мая 2022 г.</a:t>
+              <a:t>23 мая 2022 г.</a:t>
             </a:fld>
             <a:endParaRPr lang="ru-RU" noProof="0">
               <a:latin typeface="+mn-lt"/>
@@ -13867,7 +13454,7 @@
             <a:srgbClr val="547EBF"/>
           </p15:clr>
         </p15:guide>
-        <p15:guide id="7" pos="600" userDrawn="1">
+        <p15:guide id="7" pos="600">
           <p15:clr>
             <a:srgbClr val="547EBF"/>
           </p15:clr>
@@ -13917,7 +13504,7 @@
             <a:srgbClr val="9FCC3B"/>
           </p15:clr>
         </p15:guide>
-        <p15:guide id="17" pos="3940" userDrawn="1">
+        <p15:guide id="17" pos="3940">
           <p15:clr>
             <a:srgbClr val="F26B43"/>
           </p15:clr>
@@ -14440,6 +14027,205 @@
       </p:grpSpPr>
       <p:sp>
         <p:nvSpPr>
+          <p:cNvPr id="18" name="Прямоугольник 17">
+            <a:extLst>
+              <a:ext uri="{FF2B5EF4-FFF2-40B4-BE49-F238E27FC236}">
+                <a16:creationId xmlns:a16="http://schemas.microsoft.com/office/drawing/2014/main" id="{E784B271-2197-A99A-14CE-85FBF08D0701}"/>
+              </a:ext>
+            </a:extLst>
+          </p:cNvPr>
+          <p:cNvSpPr/>
+          <p:nvPr/>
+        </p:nvSpPr>
+        <p:spPr>
+          <a:xfrm>
+            <a:off x="3247505" y="0"/>
+            <a:ext cx="8944495" cy="5307746"/>
+          </a:xfrm>
+          <a:prstGeom prst="rect">
+            <a:avLst/>
+          </a:prstGeom>
+          <a:solidFill>
+            <a:schemeClr val="tx1"/>
+          </a:solidFill>
+          <a:ln>
+            <a:noFill/>
+          </a:ln>
+        </p:spPr>
+        <p:style>
+          <a:lnRef idx="2">
+            <a:schemeClr val="accent1">
+              <a:shade val="50000"/>
+            </a:schemeClr>
+          </a:lnRef>
+          <a:fillRef idx="1">
+            <a:schemeClr val="accent1"/>
+          </a:fillRef>
+          <a:effectRef idx="0">
+            <a:schemeClr val="accent1"/>
+          </a:effectRef>
+          <a:fontRef idx="minor">
+            <a:schemeClr val="lt1"/>
+          </a:fontRef>
+        </p:style>
+        <p:txBody>
+          <a:bodyPr rtlCol="0" anchor="ctr"/>
+          <a:lstStyle/>
+          <a:p>
+            <a:pPr algn="ctr"/>
+            <a:endParaRPr lang="ru-RU" dirty="0"/>
+          </a:p>
+        </p:txBody>
+      </p:sp>
+      <p:sp>
+        <p:nvSpPr>
+          <p:cNvPr id="2" name="Заголовок 1">
+            <a:extLst>
+              <a:ext uri="{FF2B5EF4-FFF2-40B4-BE49-F238E27FC236}">
+                <a16:creationId xmlns:a16="http://schemas.microsoft.com/office/drawing/2014/main" id="{E3C30C21-14D6-AC98-2D05-6293B2964B06}"/>
+              </a:ext>
+            </a:extLst>
+          </p:cNvPr>
+          <p:cNvSpPr>
+            <a:spLocks noGrp="1"/>
+          </p:cNvSpPr>
+          <p:nvPr>
+            <p:ph type="title"/>
+          </p:nvPr>
+        </p:nvSpPr>
+        <p:spPr>
+          <a:xfrm>
+            <a:off x="964023" y="205732"/>
+            <a:ext cx="7049446" cy="610863"/>
+          </a:xfrm>
+        </p:spPr>
+        <p:txBody>
+          <a:bodyPr>
+            <a:normAutofit fontScale="90000"/>
+          </a:bodyPr>
+          <a:lstStyle/>
+          <a:p>
+            <a:r>
+              <a:rPr lang="en-US" dirty="0">
+                <a:latin typeface="Montserrat" pitchFamily="2" charset="-52"/>
+              </a:rPr>
+              <a:t>UML-</a:t>
+            </a:r>
+            <a:r>
+              <a:rPr lang="ru-RU" dirty="0">
+                <a:latin typeface="Montserrat" pitchFamily="2" charset="-52"/>
+              </a:rPr>
+              <a:t>диаграмма проекта</a:t>
+            </a:r>
+          </a:p>
+        </p:txBody>
+      </p:sp>
+      <p:pic>
+        <p:nvPicPr>
+          <p:cNvPr id="17" name="Рисунок 16">
+            <a:extLst>
+              <a:ext uri="{FF2B5EF4-FFF2-40B4-BE49-F238E27FC236}">
+                <a16:creationId xmlns:a16="http://schemas.microsoft.com/office/drawing/2014/main" id="{74DEB04F-B31F-79E7-2884-CBBB1C7E0897}"/>
+              </a:ext>
+            </a:extLst>
+          </p:cNvPr>
+          <p:cNvPicPr>
+            <a:picLocks noChangeAspect="1"/>
+          </p:cNvPicPr>
+          <p:nvPr/>
+        </p:nvPicPr>
+        <p:blipFill rotWithShape="1">
+          <a:blip r:embed="rId2">
+            <a:extLst>
+              <a:ext uri="{28A0092B-C50C-407E-A947-70E740481C1C}">
+                <a14:useLocalDpi xmlns:a14="http://schemas.microsoft.com/office/drawing/2010/main" val="0"/>
+              </a:ext>
+            </a:extLst>
+          </a:blip>
+          <a:srcRect r="65295" b="69088"/>
+          <a:stretch/>
+        </p:blipFill>
+        <p:spPr>
+          <a:xfrm>
+            <a:off x="198227" y="816595"/>
+            <a:ext cx="11795546" cy="5835673"/>
+          </a:xfrm>
+          <a:prstGeom prst="rect">
+            <a:avLst/>
+          </a:prstGeom>
+        </p:spPr>
+      </p:pic>
+      <p:pic>
+        <p:nvPicPr>
+          <p:cNvPr id="19" name="Рисунок 18">
+            <a:extLst>
+              <a:ext uri="{FF2B5EF4-FFF2-40B4-BE49-F238E27FC236}">
+                <a16:creationId xmlns:a16="http://schemas.microsoft.com/office/drawing/2014/main" id="{2C8FBEE3-A45A-AD3D-9C10-51CF1CEDF636}"/>
+              </a:ext>
+            </a:extLst>
+          </p:cNvPr>
+          <p:cNvPicPr>
+            <a:picLocks noChangeAspect="1"/>
+          </p:cNvPicPr>
+          <p:nvPr/>
+        </p:nvPicPr>
+        <p:blipFill>
+          <a:blip r:embed="rId3">
+            <a:extLst>
+              <a:ext uri="{28A0092B-C50C-407E-A947-70E740481C1C}">
+                <a14:useLocalDpi xmlns:a14="http://schemas.microsoft.com/office/drawing/2010/main" val="0"/>
+              </a:ext>
+              <a:ext uri="{96DAC541-7B7A-43D3-8B79-37D633B846F1}">
+                <asvg:svgBlip xmlns:asvg="http://schemas.microsoft.com/office/drawing/2016/SVG/main" r:embed="rId4"/>
+              </a:ext>
+            </a:extLst>
+          </a:blip>
+          <a:stretch>
+            <a:fillRect/>
+          </a:stretch>
+        </p:blipFill>
+        <p:spPr>
+          <a:xfrm>
+            <a:off x="9444876" y="6066055"/>
+            <a:ext cx="2366124" cy="791945"/>
+          </a:xfrm>
+          <a:prstGeom prst="rect">
+            <a:avLst/>
+          </a:prstGeom>
+        </p:spPr>
+      </p:pic>
+    </p:spTree>
+    <p:extLst>
+      <p:ext uri="{BB962C8B-B14F-4D97-AF65-F5344CB8AC3E}">
+        <p14:creationId xmlns:p14="http://schemas.microsoft.com/office/powerpoint/2010/main" val="2827976698"/>
+      </p:ext>
+    </p:extLst>
+  </p:cSld>
+  <p:clrMapOvr>
+    <a:masterClrMapping/>
+  </p:clrMapOvr>
+</p:sld>
+</file>
+
+<file path=ppt/slides/slide4.xml><?xml version="1.0" encoding="utf-8"?>
+<p:sld xmlns:a="http://schemas.openxmlformats.org/drawingml/2006/main" xmlns:r="http://schemas.openxmlformats.org/officeDocument/2006/relationships" xmlns:p="http://schemas.openxmlformats.org/presentationml/2006/main">
+  <p:cSld>
+    <p:spTree>
+      <p:nvGrpSpPr>
+        <p:cNvPr id="1" name=""/>
+        <p:cNvGrpSpPr/>
+        <p:nvPr/>
+      </p:nvGrpSpPr>
+      <p:grpSpPr>
+        <a:xfrm>
+          <a:off x="0" y="0"/>
+          <a:ext cx="0" cy="0"/>
+          <a:chOff x="0" y="0"/>
+          <a:chExt cx="0" cy="0"/>
+        </a:xfrm>
+      </p:grpSpPr>
+      <p:sp>
+        <p:nvSpPr>
           <p:cNvPr id="2" name="Заголовок 1">
             <a:extLst>
               <a:ext uri="{FF2B5EF4-FFF2-40B4-BE49-F238E27FC236}">
@@ -14677,7 +14463,431 @@
 </p:sld>
 </file>
 
-<file path=ppt/slides/slide4.xml><?xml version="1.0" encoding="utf-8"?>
+<file path=ppt/slides/slide5.xml><?xml version="1.0" encoding="utf-8"?>
+<p:sld xmlns:a="http://schemas.openxmlformats.org/drawingml/2006/main" xmlns:r="http://schemas.openxmlformats.org/officeDocument/2006/relationships" xmlns:p="http://schemas.openxmlformats.org/presentationml/2006/main">
+  <p:cSld>
+    <p:spTree>
+      <p:nvGrpSpPr>
+        <p:cNvPr id="1" name=""/>
+        <p:cNvGrpSpPr/>
+        <p:nvPr/>
+      </p:nvGrpSpPr>
+      <p:grpSpPr>
+        <a:xfrm>
+          <a:off x="0" y="0"/>
+          <a:ext cx="0" cy="0"/>
+          <a:chOff x="0" y="0"/>
+          <a:chExt cx="0" cy="0"/>
+        </a:xfrm>
+      </p:grpSpPr>
+      <p:sp>
+        <p:nvSpPr>
+          <p:cNvPr id="2" name="Заголовок 1">
+            <a:extLst>
+              <a:ext uri="{FF2B5EF4-FFF2-40B4-BE49-F238E27FC236}">
+                <a16:creationId xmlns:a16="http://schemas.microsoft.com/office/drawing/2014/main" id="{C4A90B27-FE1D-B845-7B8F-278D3926B3A8}"/>
+              </a:ext>
+            </a:extLst>
+          </p:cNvPr>
+          <p:cNvSpPr>
+            <a:spLocks noGrp="1"/>
+          </p:cNvSpPr>
+          <p:nvPr>
+            <p:ph type="title"/>
+          </p:nvPr>
+        </p:nvSpPr>
+        <p:spPr>
+          <a:xfrm>
+            <a:off x="964023" y="879063"/>
+            <a:ext cx="6608872" cy="610863"/>
+          </a:xfrm>
+        </p:spPr>
+        <p:txBody>
+          <a:bodyPr>
+            <a:normAutofit fontScale="90000"/>
+          </a:bodyPr>
+          <a:lstStyle/>
+          <a:p>
+            <a:r>
+              <a:rPr lang="ru-RU" dirty="0">
+                <a:latin typeface="Montserrat" pitchFamily="2" charset="-52"/>
+              </a:rPr>
+              <a:t>Компоненты системы</a:t>
+            </a:r>
+          </a:p>
+        </p:txBody>
+      </p:sp>
+      <p:pic>
+        <p:nvPicPr>
+          <p:cNvPr id="12" name="Рисунок 11">
+            <a:extLst>
+              <a:ext uri="{FF2B5EF4-FFF2-40B4-BE49-F238E27FC236}">
+                <a16:creationId xmlns:a16="http://schemas.microsoft.com/office/drawing/2014/main" id="{991904CA-05D1-0FF1-C2B1-5859D0CC6FF1}"/>
+              </a:ext>
+            </a:extLst>
+          </p:cNvPr>
+          <p:cNvPicPr>
+            <a:picLocks noChangeAspect="1"/>
+          </p:cNvPicPr>
+          <p:nvPr/>
+        </p:nvPicPr>
+        <p:blipFill>
+          <a:blip r:embed="rId2">
+            <a:extLst>
+              <a:ext uri="{28A0092B-C50C-407E-A947-70E740481C1C}">
+                <a14:useLocalDpi xmlns:a14="http://schemas.microsoft.com/office/drawing/2010/main" val="0"/>
+              </a:ext>
+              <a:ext uri="{96DAC541-7B7A-43D3-8B79-37D633B846F1}">
+                <asvg:svgBlip xmlns:asvg="http://schemas.microsoft.com/office/drawing/2016/SVG/main" r:embed="rId3"/>
+              </a:ext>
+            </a:extLst>
+          </a:blip>
+          <a:stretch>
+            <a:fillRect/>
+          </a:stretch>
+        </p:blipFill>
+        <p:spPr>
+          <a:xfrm>
+            <a:off x="9444876" y="6066055"/>
+            <a:ext cx="2366124" cy="791945"/>
+          </a:xfrm>
+          <a:prstGeom prst="rect">
+            <a:avLst/>
+          </a:prstGeom>
+        </p:spPr>
+      </p:pic>
+      <p:pic>
+        <p:nvPicPr>
+          <p:cNvPr id="1026" name="Picture 2" descr="Yalantis">
+            <a:extLst>
+              <a:ext uri="{FF2B5EF4-FFF2-40B4-BE49-F238E27FC236}">
+                <a16:creationId xmlns:a16="http://schemas.microsoft.com/office/drawing/2014/main" id="{90F69ED6-05D9-72DE-9D48-CB40F12F88F5}"/>
+              </a:ext>
+            </a:extLst>
+          </p:cNvPr>
+          <p:cNvPicPr>
+            <a:picLocks noChangeAspect="1" noChangeArrowheads="1"/>
+          </p:cNvPicPr>
+          <p:nvPr/>
+        </p:nvPicPr>
+        <p:blipFill>
+          <a:blip r:embed="rId4">
+            <a:extLst>
+              <a:ext uri="{28A0092B-C50C-407E-A947-70E740481C1C}">
+                <a14:useLocalDpi xmlns:a14="http://schemas.microsoft.com/office/drawing/2010/main" val="0"/>
+              </a:ext>
+            </a:extLst>
+          </a:blip>
+          <a:srcRect/>
+          <a:stretch>
+            <a:fillRect/>
+          </a:stretch>
+        </p:blipFill>
+        <p:spPr bwMode="auto">
+          <a:xfrm>
+            <a:off x="739833" y="2336517"/>
+            <a:ext cx="2568634" cy="963238"/>
+          </a:xfrm>
+          <a:prstGeom prst="rect">
+            <a:avLst/>
+          </a:prstGeom>
+          <a:noFill/>
+          <a:extLst>
+            <a:ext uri="{909E8E84-426E-40DD-AFC4-6F175D3DCCD1}">
+              <a14:hiddenFill xmlns:a14="http://schemas.microsoft.com/office/drawing/2010/main">
+                <a:solidFill>
+                  <a:srgbClr val="FFFFFF"/>
+                </a:solidFill>
+              </a14:hiddenFill>
+            </a:ext>
+          </a:extLst>
+        </p:spPr>
+      </p:pic>
+      <p:pic>
+        <p:nvPicPr>
+          <p:cNvPr id="1028" name="Picture 4" descr="Material Design Color Palette - IntelliJ IDEs Plugin | Marketplace">
+            <a:extLst>
+              <a:ext uri="{FF2B5EF4-FFF2-40B4-BE49-F238E27FC236}">
+                <a16:creationId xmlns:a16="http://schemas.microsoft.com/office/drawing/2014/main" id="{7BC35F98-6D04-3BBC-9D04-7128F29C92E4}"/>
+              </a:ext>
+            </a:extLst>
+          </p:cNvPr>
+          <p:cNvPicPr>
+            <a:picLocks noChangeAspect="1" noChangeArrowheads="1"/>
+          </p:cNvPicPr>
+          <p:nvPr/>
+        </p:nvPicPr>
+        <p:blipFill>
+          <a:blip r:embed="rId5">
+            <a:extLst>
+              <a:ext uri="{28A0092B-C50C-407E-A947-70E740481C1C}">
+                <a14:useLocalDpi xmlns:a14="http://schemas.microsoft.com/office/drawing/2010/main" val="0"/>
+              </a:ext>
+            </a:extLst>
+          </a:blip>
+          <a:srcRect/>
+          <a:stretch>
+            <a:fillRect/>
+          </a:stretch>
+        </p:blipFill>
+        <p:spPr bwMode="auto">
+          <a:xfrm>
+            <a:off x="4974562" y="2179094"/>
+            <a:ext cx="1278083" cy="1278083"/>
+          </a:xfrm>
+          <a:prstGeom prst="rect">
+            <a:avLst/>
+          </a:prstGeom>
+          <a:noFill/>
+          <a:extLst>
+            <a:ext uri="{909E8E84-426E-40DD-AFC4-6F175D3DCCD1}">
+              <a14:hiddenFill xmlns:a14="http://schemas.microsoft.com/office/drawing/2010/main">
+                <a:solidFill>
+                  <a:srgbClr val="FFFFFF"/>
+                </a:solidFill>
+              </a14:hiddenFill>
+            </a:ext>
+          </a:extLst>
+        </p:spPr>
+      </p:pic>
+      <p:pic>
+        <p:nvPicPr>
+          <p:cNvPr id="1030" name="Picture 6" descr="News API to Outsystems - Precog">
+            <a:extLst>
+              <a:ext uri="{FF2B5EF4-FFF2-40B4-BE49-F238E27FC236}">
+                <a16:creationId xmlns:a16="http://schemas.microsoft.com/office/drawing/2014/main" id="{F2310E38-29AA-B0A4-4F1C-CA5D13F6111C}"/>
+              </a:ext>
+            </a:extLst>
+          </p:cNvPr>
+          <p:cNvPicPr>
+            <a:picLocks noChangeAspect="1" noChangeArrowheads="1"/>
+          </p:cNvPicPr>
+          <p:nvPr/>
+        </p:nvPicPr>
+        <p:blipFill>
+          <a:blip r:embed="rId6">
+            <a:extLst>
+              <a:ext uri="{28A0092B-C50C-407E-A947-70E740481C1C}">
+                <a14:useLocalDpi xmlns:a14="http://schemas.microsoft.com/office/drawing/2010/main" val="0"/>
+              </a:ext>
+            </a:extLst>
+          </a:blip>
+          <a:srcRect/>
+          <a:stretch>
+            <a:fillRect/>
+          </a:stretch>
+        </p:blipFill>
+        <p:spPr bwMode="auto">
+          <a:xfrm>
+            <a:off x="7918740" y="2336517"/>
+            <a:ext cx="2680929" cy="791945"/>
+          </a:xfrm>
+          <a:prstGeom prst="rect">
+            <a:avLst/>
+          </a:prstGeom>
+          <a:noFill/>
+          <a:extLst>
+            <a:ext uri="{909E8E84-426E-40DD-AFC4-6F175D3DCCD1}">
+              <a14:hiddenFill xmlns:a14="http://schemas.microsoft.com/office/drawing/2010/main">
+                <a:solidFill>
+                  <a:srgbClr val="FFFFFF"/>
+                </a:solidFill>
+              </a14:hiddenFill>
+            </a:ext>
+          </a:extLst>
+        </p:spPr>
+      </p:pic>
+      <p:sp>
+        <p:nvSpPr>
+          <p:cNvPr id="13" name="TextBox 12">
+            <a:extLst>
+              <a:ext uri="{FF2B5EF4-FFF2-40B4-BE49-F238E27FC236}">
+                <a16:creationId xmlns:a16="http://schemas.microsoft.com/office/drawing/2014/main" id="{22316F9B-2C01-355F-52F3-D9275A2F27FD}"/>
+              </a:ext>
+            </a:extLst>
+          </p:cNvPr>
+          <p:cNvSpPr txBox="1"/>
+          <p:nvPr/>
+        </p:nvSpPr>
+        <p:spPr>
+          <a:xfrm>
+            <a:off x="964023" y="3633063"/>
+            <a:ext cx="2119999" cy="646331"/>
+          </a:xfrm>
+          <a:prstGeom prst="rect">
+            <a:avLst/>
+          </a:prstGeom>
+          <a:noFill/>
+        </p:spPr>
+        <p:txBody>
+          <a:bodyPr wrap="square" rtlCol="0">
+            <a:spAutoFit/>
+          </a:bodyPr>
+          <a:lstStyle/>
+          <a:p>
+            <a:pPr algn="ctr"/>
+            <a:r>
+              <a:rPr lang="ru-RU" dirty="0">
+                <a:solidFill>
+                  <a:schemeClr val="bg1"/>
+                </a:solidFill>
+                <a:latin typeface="Montserrat" pitchFamily="2" charset="-52"/>
+              </a:rPr>
+              <a:t>Библиотека </a:t>
+            </a:r>
+            <a:r>
+              <a:rPr lang="en-US" dirty="0" err="1">
+                <a:solidFill>
+                  <a:schemeClr val="bg1"/>
+                </a:solidFill>
+                <a:latin typeface="Montserrat" pitchFamily="2" charset="-52"/>
+              </a:rPr>
+              <a:t>Koloda</a:t>
+            </a:r>
+            <a:endParaRPr lang="ru-RU" dirty="0">
+              <a:solidFill>
+                <a:schemeClr val="bg1"/>
+              </a:solidFill>
+              <a:latin typeface="Montserrat" pitchFamily="2" charset="-52"/>
+            </a:endParaRPr>
+          </a:p>
+        </p:txBody>
+      </p:sp>
+      <p:sp>
+        <p:nvSpPr>
+          <p:cNvPr id="17" name="TextBox 16">
+            <a:extLst>
+              <a:ext uri="{FF2B5EF4-FFF2-40B4-BE49-F238E27FC236}">
+                <a16:creationId xmlns:a16="http://schemas.microsoft.com/office/drawing/2014/main" id="{CA4D09ED-4004-2C2F-E9DC-3D018FD546CF}"/>
+              </a:ext>
+            </a:extLst>
+          </p:cNvPr>
+          <p:cNvSpPr txBox="1"/>
+          <p:nvPr/>
+        </p:nvSpPr>
+        <p:spPr>
+          <a:xfrm>
+            <a:off x="4553603" y="3633063"/>
+            <a:ext cx="2119999" cy="646331"/>
+          </a:xfrm>
+          <a:prstGeom prst="rect">
+            <a:avLst/>
+          </a:prstGeom>
+          <a:noFill/>
+        </p:spPr>
+        <p:txBody>
+          <a:bodyPr wrap="square" rtlCol="0">
+            <a:spAutoFit/>
+          </a:bodyPr>
+          <a:lstStyle/>
+          <a:p>
+            <a:pPr algn="ctr"/>
+            <a:r>
+              <a:rPr lang="ru-RU" dirty="0">
+                <a:solidFill>
+                  <a:schemeClr val="bg1"/>
+                </a:solidFill>
+                <a:latin typeface="Montserrat" pitchFamily="2" charset="-52"/>
+              </a:rPr>
+              <a:t>Компоненты</a:t>
+            </a:r>
+            <a:r>
+              <a:rPr lang="en-US" dirty="0">
+                <a:solidFill>
+                  <a:schemeClr val="bg1"/>
+                </a:solidFill>
+                <a:latin typeface="Montserrat" pitchFamily="2" charset="-52"/>
+              </a:rPr>
+              <a:t> Material Design</a:t>
+            </a:r>
+            <a:endParaRPr lang="ru-RU" dirty="0">
+              <a:solidFill>
+                <a:schemeClr val="bg1"/>
+              </a:solidFill>
+              <a:latin typeface="Montserrat" pitchFamily="2" charset="-52"/>
+            </a:endParaRPr>
+          </a:p>
+        </p:txBody>
+      </p:sp>
+      <p:sp>
+        <p:nvSpPr>
+          <p:cNvPr id="18" name="TextBox 17">
+            <a:extLst>
+              <a:ext uri="{FF2B5EF4-FFF2-40B4-BE49-F238E27FC236}">
+                <a16:creationId xmlns:a16="http://schemas.microsoft.com/office/drawing/2014/main" id="{7F54D367-35D2-3F19-D67B-D531DFFFF2B7}"/>
+              </a:ext>
+            </a:extLst>
+          </p:cNvPr>
+          <p:cNvSpPr txBox="1"/>
+          <p:nvPr/>
+        </p:nvSpPr>
+        <p:spPr>
+          <a:xfrm>
+            <a:off x="8199204" y="3633063"/>
+            <a:ext cx="2119999" cy="646331"/>
+          </a:xfrm>
+          <a:prstGeom prst="rect">
+            <a:avLst/>
+          </a:prstGeom>
+          <a:noFill/>
+        </p:spPr>
+        <p:txBody>
+          <a:bodyPr wrap="square" rtlCol="0">
+            <a:spAutoFit/>
+          </a:bodyPr>
+          <a:lstStyle/>
+          <a:p>
+            <a:pPr algn="ctr"/>
+            <a:r>
+              <a:rPr lang="ru-RU" dirty="0">
+                <a:solidFill>
+                  <a:schemeClr val="bg1"/>
+                </a:solidFill>
+                <a:latin typeface="Montserrat" pitchFamily="2" charset="-52"/>
+              </a:rPr>
+              <a:t>Открытое </a:t>
+            </a:r>
+            <a:r>
+              <a:rPr lang="en-US" dirty="0">
+                <a:solidFill>
+                  <a:schemeClr val="bg1"/>
+                </a:solidFill>
+                <a:latin typeface="Montserrat" pitchFamily="2" charset="-52"/>
+              </a:rPr>
+              <a:t>API </a:t>
+            </a:r>
+            <a:r>
+              <a:rPr lang="en-US" dirty="0" err="1">
+                <a:solidFill>
+                  <a:schemeClr val="bg1"/>
+                </a:solidFill>
+                <a:latin typeface="Montserrat" pitchFamily="2" charset="-52"/>
+              </a:rPr>
+              <a:t>NewsAPI</a:t>
+            </a:r>
+            <a:endParaRPr lang="ru-RU" dirty="0">
+              <a:solidFill>
+                <a:schemeClr val="bg1"/>
+              </a:solidFill>
+              <a:latin typeface="Montserrat" pitchFamily="2" charset="-52"/>
+            </a:endParaRPr>
+          </a:p>
+        </p:txBody>
+      </p:sp>
+    </p:spTree>
+    <p:extLst>
+      <p:ext uri="{BB962C8B-B14F-4D97-AF65-F5344CB8AC3E}">
+        <p14:creationId xmlns:p14="http://schemas.microsoft.com/office/powerpoint/2010/main" val="1069340432"/>
+      </p:ext>
+    </p:extLst>
+  </p:cSld>
+  <p:clrMapOvr>
+    <a:masterClrMapping/>
+  </p:clrMapOvr>
+</p:sld>
+</file>
+
+<file path=ppt/slides/slide6.xml><?xml version="1.0" encoding="utf-8"?>
 <p:sld xmlns:a="http://schemas.openxmlformats.org/drawingml/2006/main" xmlns:r="http://schemas.openxmlformats.org/officeDocument/2006/relationships" xmlns:p="http://schemas.openxmlformats.org/presentationml/2006/main">
   <p:cSld>
     <p:spTree>
@@ -14880,7 +15090,7 @@
 </p:sld>
 </file>
 
-<file path=ppt/slides/slide5.xml><?xml version="1.0" encoding="utf-8"?>
+<file path=ppt/slides/slide7.xml><?xml version="1.0" encoding="utf-8"?>
 <p:sld xmlns:a="http://schemas.openxmlformats.org/drawingml/2006/main" xmlns:r="http://schemas.openxmlformats.org/officeDocument/2006/relationships" xmlns:p="http://schemas.openxmlformats.org/presentationml/2006/main">
   <p:cSld>
     <p:spTree>
@@ -15043,7 +15253,7 @@
 </p:sld>
 </file>
 
-<file path=ppt/slides/slide6.xml><?xml version="1.0" encoding="utf-8"?>
+<file path=ppt/slides/slide8.xml><?xml version="1.0" encoding="utf-8"?>
 <p:sld xmlns:a="http://schemas.openxmlformats.org/drawingml/2006/main" xmlns:r="http://schemas.openxmlformats.org/officeDocument/2006/relationships" xmlns:p="http://schemas.openxmlformats.org/presentationml/2006/main">
   <p:cSld>
     <p:spTree>
@@ -15464,7 +15674,7 @@
 </p:sld>
 </file>
 
-<file path=ppt/slides/slide7.xml><?xml version="1.0" encoding="utf-8"?>
+<file path=ppt/slides/slide9.xml><?xml version="1.0" encoding="utf-8"?>
 <p:sld xmlns:a="http://schemas.openxmlformats.org/drawingml/2006/main" xmlns:r="http://schemas.openxmlformats.org/officeDocument/2006/relationships" xmlns:p="http://schemas.openxmlformats.org/presentationml/2006/main">
   <p:cSld>
     <p:spTree>

</xml_diff>